<commit_message>
Documents updated/Frontend updated(Errors fixed)/ReadMe updated(Video updated, Metrics added)
</commit_message>
<xml_diff>
--- a/documents/Presentaciya.pptx
+++ b/documents/Presentaciya.pptx
@@ -262,7 +262,7 @@
           <a:p>
             <a:fld id="{93B89C04-B26F-4D99-B64C-FD543973293C}" type="datetimeFigureOut">
               <a:rPr lang="ru-RU" smtClean="0"/>
-              <a:t>16.06.2020</a:t>
+              <a:t>19.06.2020</a:t>
             </a:fld>
             <a:endParaRPr lang="ru-RU"/>
           </a:p>
@@ -432,7 +432,7 @@
           <a:p>
             <a:fld id="{93B89C04-B26F-4D99-B64C-FD543973293C}" type="datetimeFigureOut">
               <a:rPr lang="ru-RU" smtClean="0"/>
-              <a:t>16.06.2020</a:t>
+              <a:t>19.06.2020</a:t>
             </a:fld>
             <a:endParaRPr lang="ru-RU"/>
           </a:p>
@@ -612,7 +612,7 @@
           <a:p>
             <a:fld id="{93B89C04-B26F-4D99-B64C-FD543973293C}" type="datetimeFigureOut">
               <a:rPr lang="ru-RU" smtClean="0"/>
-              <a:t>16.06.2020</a:t>
+              <a:t>19.06.2020</a:t>
             </a:fld>
             <a:endParaRPr lang="ru-RU"/>
           </a:p>
@@ -782,7 +782,7 @@
           <a:p>
             <a:fld id="{93B89C04-B26F-4D99-B64C-FD543973293C}" type="datetimeFigureOut">
               <a:rPr lang="ru-RU" smtClean="0"/>
-              <a:t>16.06.2020</a:t>
+              <a:t>19.06.2020</a:t>
             </a:fld>
             <a:endParaRPr lang="ru-RU"/>
           </a:p>
@@ -1028,7 +1028,7 @@
           <a:p>
             <a:fld id="{93B89C04-B26F-4D99-B64C-FD543973293C}" type="datetimeFigureOut">
               <a:rPr lang="ru-RU" smtClean="0"/>
-              <a:t>16.06.2020</a:t>
+              <a:t>19.06.2020</a:t>
             </a:fld>
             <a:endParaRPr lang="ru-RU"/>
           </a:p>
@@ -1260,7 +1260,7 @@
           <a:p>
             <a:fld id="{93B89C04-B26F-4D99-B64C-FD543973293C}" type="datetimeFigureOut">
               <a:rPr lang="ru-RU" smtClean="0"/>
-              <a:t>16.06.2020</a:t>
+              <a:t>19.06.2020</a:t>
             </a:fld>
             <a:endParaRPr lang="ru-RU"/>
           </a:p>
@@ -1627,7 +1627,7 @@
           <a:p>
             <a:fld id="{93B89C04-B26F-4D99-B64C-FD543973293C}" type="datetimeFigureOut">
               <a:rPr lang="ru-RU" smtClean="0"/>
-              <a:t>16.06.2020</a:t>
+              <a:t>19.06.2020</a:t>
             </a:fld>
             <a:endParaRPr lang="ru-RU"/>
           </a:p>
@@ -1745,7 +1745,7 @@
           <a:p>
             <a:fld id="{93B89C04-B26F-4D99-B64C-FD543973293C}" type="datetimeFigureOut">
               <a:rPr lang="ru-RU" smtClean="0"/>
-              <a:t>16.06.2020</a:t>
+              <a:t>19.06.2020</a:t>
             </a:fld>
             <a:endParaRPr lang="ru-RU"/>
           </a:p>
@@ -1840,7 +1840,7 @@
           <a:p>
             <a:fld id="{93B89C04-B26F-4D99-B64C-FD543973293C}" type="datetimeFigureOut">
               <a:rPr lang="ru-RU" smtClean="0"/>
-              <a:t>16.06.2020</a:t>
+              <a:t>19.06.2020</a:t>
             </a:fld>
             <a:endParaRPr lang="ru-RU"/>
           </a:p>
@@ -2117,7 +2117,7 @@
           <a:p>
             <a:fld id="{93B89C04-B26F-4D99-B64C-FD543973293C}" type="datetimeFigureOut">
               <a:rPr lang="ru-RU" smtClean="0"/>
-              <a:t>16.06.2020</a:t>
+              <a:t>19.06.2020</a:t>
             </a:fld>
             <a:endParaRPr lang="ru-RU"/>
           </a:p>
@@ -2370,7 +2370,7 @@
           <a:p>
             <a:fld id="{93B89C04-B26F-4D99-B64C-FD543973293C}" type="datetimeFigureOut">
               <a:rPr lang="ru-RU" smtClean="0"/>
-              <a:t>16.06.2020</a:t>
+              <a:t>19.06.2020</a:t>
             </a:fld>
             <a:endParaRPr lang="ru-RU"/>
           </a:p>
@@ -2583,7 +2583,7 @@
           <a:p>
             <a:fld id="{93B89C04-B26F-4D99-B64C-FD543973293C}" type="datetimeFigureOut">
               <a:rPr lang="ru-RU" smtClean="0"/>
-              <a:t>16.06.2020</a:t>
+              <a:t>19.06.2020</a:t>
             </a:fld>
             <a:endParaRPr lang="ru-RU"/>
           </a:p>
@@ -3983,14 +3983,7 @@
                 <a:latin typeface="Times New Roman" panose="02020603050405020304" pitchFamily="18" charset="0"/>
                 <a:cs typeface="Times New Roman" panose="02020603050405020304" pitchFamily="18" charset="0"/>
               </a:rPr>
-              <a:t>Домашняя страница </a:t>
-            </a:r>
-            <a:r>
-              <a:rPr lang="ru-RU" sz="3600" dirty="0" smtClean="0">
-                <a:latin typeface="Times New Roman" panose="02020603050405020304" pitchFamily="18" charset="0"/>
-                <a:cs typeface="Times New Roman" panose="02020603050405020304" pitchFamily="18" charset="0"/>
-              </a:rPr>
-              <a:t>не верифицированного пользователя</a:t>
+              <a:t>Домашняя страница не верифицированного пользователя</a:t>
             </a:r>
             <a:endParaRPr lang="ru-RU" sz="3600" dirty="0">
               <a:latin typeface="Times New Roman" panose="02020603050405020304" pitchFamily="18" charset="0"/>
@@ -4113,14 +4106,7 @@
                 <a:latin typeface="Times New Roman" panose="02020603050405020304" pitchFamily="18" charset="0"/>
                 <a:cs typeface="Times New Roman" panose="02020603050405020304" pitchFamily="18" charset="0"/>
               </a:rPr>
-              <a:t>Домашняя страница и личный </a:t>
-            </a:r>
-            <a:r>
-              <a:rPr lang="ru-RU" sz="3600" dirty="0" smtClean="0">
-                <a:latin typeface="Times New Roman" panose="02020603050405020304" pitchFamily="18" charset="0"/>
-                <a:cs typeface="Times New Roman" panose="02020603050405020304" pitchFamily="18" charset="0"/>
-              </a:rPr>
-              <a:t>кабинет пользователя</a:t>
+              <a:t>Домашняя страница и личный кабинет пользователя</a:t>
             </a:r>
             <a:endParaRPr lang="ru-RU" sz="3600" dirty="0">
               <a:latin typeface="Times New Roman" panose="02020603050405020304" pitchFamily="18" charset="0"/>
@@ -4187,7 +4173,7 @@
       </p:sp>
       <p:pic>
         <p:nvPicPr>
-          <p:cNvPr id="8" name="Рисунок 7"/>
+          <p:cNvPr id="3" name="Рисунок 2"/>
           <p:cNvPicPr>
             <a:picLocks noChangeAspect="1"/>
           </p:cNvPicPr>
@@ -4207,8 +4193,8 @@
         </p:blipFill>
         <p:spPr>
           <a:xfrm>
-            <a:off x="6174766" y="1596717"/>
-            <a:ext cx="5272235" cy="5036165"/>
+            <a:off x="691979" y="1553028"/>
+            <a:ext cx="5447279" cy="5203371"/>
           </a:xfrm>
           <a:prstGeom prst="rect">
             <a:avLst/>
@@ -4217,7 +4203,7 @@
       </p:pic>
       <p:pic>
         <p:nvPicPr>
-          <p:cNvPr id="2" name="Рисунок 1"/>
+          <p:cNvPr id="6" name="Рисунок 5"/>
           <p:cNvPicPr>
             <a:picLocks noChangeAspect="1"/>
           </p:cNvPicPr>
@@ -4237,8 +4223,8 @@
         </p:blipFill>
         <p:spPr>
           <a:xfrm>
-            <a:off x="922486" y="1546503"/>
-            <a:ext cx="4850498" cy="5136591"/>
+            <a:off x="6444342" y="1371600"/>
+            <a:ext cx="5142537" cy="5304972"/>
           </a:xfrm>
           <a:prstGeom prst="rect">
             <a:avLst/>
@@ -4556,14 +4542,7 @@
                 <a:latin typeface="Times New Roman" panose="02020603050405020304" pitchFamily="18" charset="0"/>
                 <a:cs typeface="Times New Roman" panose="02020603050405020304" pitchFamily="18" charset="0"/>
               </a:rPr>
-              <a:t>Домашняя страница </a:t>
-            </a:r>
-            <a:r>
-              <a:rPr lang="ru-RU" sz="3600" dirty="0" smtClean="0">
-                <a:latin typeface="Times New Roman" panose="02020603050405020304" pitchFamily="18" charset="0"/>
-                <a:cs typeface="Times New Roman" panose="02020603050405020304" pitchFamily="18" charset="0"/>
-              </a:rPr>
-              <a:t>администратора</a:t>
+              <a:t>Домашняя страница администратора</a:t>
             </a:r>
             <a:endParaRPr lang="ru-RU" sz="3600" dirty="0">
               <a:latin typeface="Times New Roman" panose="02020603050405020304" pitchFamily="18" charset="0"/>
@@ -6063,7 +6042,7 @@
       </p:sp>
       <p:pic>
         <p:nvPicPr>
-          <p:cNvPr id="4" name="Объект 3"/>
+          <p:cNvPr id="5" name="Объект 4"/>
           <p:cNvPicPr>
             <a:picLocks noGrp="1" noChangeAspect="1"/>
           </p:cNvPicPr>
@@ -6085,8 +6064,8 @@
         </p:blipFill>
         <p:spPr>
           <a:xfrm>
-            <a:off x="1801091" y="928522"/>
-            <a:ext cx="9878415" cy="5691788"/>
+            <a:off x="2105891" y="961661"/>
+            <a:ext cx="8520545" cy="5506247"/>
           </a:xfrm>
         </p:spPr>
       </p:pic>
@@ -6201,24 +6180,74 @@
                 <a:latin typeface="Times New Roman" panose="02020603050405020304" pitchFamily="18" charset="0"/>
                 <a:cs typeface="Times New Roman" panose="02020603050405020304" pitchFamily="18" charset="0"/>
               </a:rPr>
-              <a:t>HTML</a:t>
-            </a:r>
-          </a:p>
-          <a:p>
+              <a:t>HTML и </a:t>
+            </a:r>
+            <a:r>
+              <a:rPr lang="en-US" sz="3600" dirty="0" smtClean="0">
+                <a:latin typeface="Times New Roman" panose="02020603050405020304" pitchFamily="18" charset="0"/>
+                <a:cs typeface="Times New Roman" panose="02020603050405020304" pitchFamily="18" charset="0"/>
+              </a:rPr>
+              <a:t>CSS</a:t>
+            </a:r>
+            <a:endParaRPr lang="ru-RU" sz="3600" dirty="0" smtClean="0">
+              <a:latin typeface="Times New Roman" panose="02020603050405020304" pitchFamily="18" charset="0"/>
+              <a:cs typeface="Times New Roman" panose="02020603050405020304" pitchFamily="18" charset="0"/>
+            </a:endParaRPr>
+          </a:p>
+          <a:p>
+            <a:r>
+              <a:rPr lang="ru-RU" sz="3600" dirty="0" smtClean="0">
+                <a:latin typeface="Times New Roman" panose="02020603050405020304" pitchFamily="18" charset="0"/>
+                <a:cs typeface="Times New Roman" panose="02020603050405020304" pitchFamily="18" charset="0"/>
+              </a:rPr>
+              <a:t>Языки </a:t>
+            </a:r>
+            <a:r>
+              <a:rPr lang="ru-RU" sz="3600" dirty="0" err="1" smtClean="0">
+                <a:latin typeface="Times New Roman" panose="02020603050405020304" pitchFamily="18" charset="0"/>
+                <a:cs typeface="Times New Roman" panose="02020603050405020304" pitchFamily="18" charset="0"/>
+              </a:rPr>
+              <a:t>Python</a:t>
+            </a:r>
+            <a:r>
+              <a:rPr lang="ru-RU" sz="3600" dirty="0" smtClean="0">
+                <a:latin typeface="Times New Roman" panose="02020603050405020304" pitchFamily="18" charset="0"/>
+                <a:cs typeface="Times New Roman" panose="02020603050405020304" pitchFamily="18" charset="0"/>
+              </a:rPr>
+              <a:t> </a:t>
+            </a:r>
             <a:r>
               <a:rPr lang="ru-RU" sz="3600" dirty="0">
                 <a:latin typeface="Times New Roman" panose="02020603050405020304" pitchFamily="18" charset="0"/>
                 <a:cs typeface="Times New Roman" panose="02020603050405020304" pitchFamily="18" charset="0"/>
               </a:rPr>
-              <a:t>Python ( Фреймворк Flask</a:t>
+              <a:t>( Фреймворк </a:t>
+            </a:r>
+            <a:r>
+              <a:rPr lang="ru-RU" sz="3600" dirty="0" err="1" smtClean="0">
+                <a:latin typeface="Times New Roman" panose="02020603050405020304" pitchFamily="18" charset="0"/>
+                <a:cs typeface="Times New Roman" panose="02020603050405020304" pitchFamily="18" charset="0"/>
+              </a:rPr>
+              <a:t>Flask</a:t>
             </a:r>
             <a:r>
               <a:rPr lang="ru-RU" sz="3600" dirty="0" smtClean="0">
                 <a:latin typeface="Times New Roman" panose="02020603050405020304" pitchFamily="18" charset="0"/>
                 <a:cs typeface="Times New Roman" panose="02020603050405020304" pitchFamily="18" charset="0"/>
               </a:rPr>
-              <a:t>)</a:t>
-            </a:r>
+              <a:t>) и</a:t>
+            </a:r>
+            <a:r>
+              <a:rPr lang="en-US" sz="3600" dirty="0" smtClean="0">
+                <a:latin typeface="Times New Roman" panose="02020603050405020304" pitchFamily="18" charset="0"/>
+                <a:cs typeface="Times New Roman" panose="02020603050405020304" pitchFamily="18" charset="0"/>
+              </a:rPr>
+              <a:t> JavaScript</a:t>
+            </a:r>
+            <a:endParaRPr lang="ru-RU" sz="3600" dirty="0" smtClean="0">
+              <a:latin typeface="Times New Roman" panose="02020603050405020304" pitchFamily="18" charset="0"/>
+              <a:cs typeface="Times New Roman" panose="02020603050405020304" pitchFamily="18" charset="0"/>
+            </a:endParaRPr>
           </a:p>
           <a:p>
             <a:r>

</xml_diff>